<commit_message>
clarifying service names and usage
</commit_message>
<xml_diff>
--- a/docs/brd-images.pptx
+++ b/docs/brd-images.pptx
@@ -3744,8 +3744,8 @@
           <a:p>
             <a:pPr algn="ctr"/>
             <a:r>
-              <a:rPr lang="en-US" dirty="0" err="1" smtClean="0"/>
-              <a:t>ProductCustomer</a:t>
+              <a:rPr lang="en-US" dirty="0" smtClean="0"/>
+              <a:t>Ownership Service</a:t>
             </a:r>
             <a:endParaRPr lang="en-US" dirty="0"/>
           </a:p>
@@ -3846,7 +3846,8 @@
             <a:avLst/>
           </a:prstGeom>
           <a:ln>
-            <a:tailEnd type="arrow"/>
+            <a:headEnd type="triangle"/>
+            <a:tailEnd type="none"/>
           </a:ln>
         </p:spPr>
         <p:style>
@@ -3884,7 +3885,8 @@
             </a:avLst>
           </a:prstGeom>
           <a:ln>
-            <a:tailEnd type="arrow"/>
+            <a:headEnd type="triangle" w="lg" len="lg"/>
+            <a:tailEnd type="none"/>
           </a:ln>
         </p:spPr>
         <p:style>

</xml_diff>